<commit_message>
Add functions in grammar
</commit_message>
<xml_diff>
--- a/Язык программирования «АК».pptx
+++ b/Язык программирования «АК».pptx
@@ -4576,12 +4576,8 @@
           </a:p>
           <a:p>
             <a:r>
-              <a:rPr lang="ru-RU" smtClean="0"/>
-              <a:t>Использование </a:t>
-            </a:r>
-            <a:r>
               <a:rPr lang="ru-RU" dirty="0" smtClean="0"/>
-              <a:t>модулей</a:t>
+              <a:t>Использование модулей</a:t>
             </a:r>
             <a:endParaRPr lang="ru-RU" dirty="0"/>
           </a:p>

</xml_diff>

<commit_message>
Add comments in grammar
</commit_message>
<xml_diff>
--- a/Язык программирования «АК».pptx
+++ b/Язык программирования «АК».pptx
@@ -5,7 +5,7 @@
     <p:sldMasterId id="2147483696" r:id="rId1"/>
   </p:sldMasterIdLst>
   <p:notesMasterIdLst>
-    <p:notesMasterId r:id="rId7"/>
+    <p:notesMasterId r:id="rId8"/>
   </p:notesMasterIdLst>
   <p:sldIdLst>
     <p:sldId id="256" r:id="rId2"/>
@@ -13,6 +13,7 @@
     <p:sldId id="258" r:id="rId4"/>
     <p:sldId id="259" r:id="rId5"/>
     <p:sldId id="260" r:id="rId6"/>
+    <p:sldId id="261" r:id="rId7"/>
   </p:sldIdLst>
   <p:sldSz cx="9144000" cy="6858000" type="screen4x3"/>
   <p:notesSz cx="6858000" cy="9144000"/>
@@ -196,6 +197,7 @@
           <a:p>
             <a:fld id="{19AF1686-B0C1-409F-971D-68F0FFA42FB5}" type="datetimeFigureOut">
               <a:rPr lang="ru-RU" smtClean="0"/>
+              <a:pPr/>
               <a:t>09.06.2016</a:t>
             </a:fld>
             <a:endParaRPr lang="ru-RU"/>
@@ -357,6 +359,7 @@
           <a:p>
             <a:fld id="{6BFAB4C0-C96F-433F-AB7D-4E562F9FAF9E}" type="slidenum">
               <a:rPr lang="ru-RU" smtClean="0"/>
+              <a:pPr/>
               <a:t>‹#›</a:t>
             </a:fld>
             <a:endParaRPr lang="ru-RU"/>
@@ -528,6 +531,7 @@
           <a:p>
             <a:fld id="{6BFAB4C0-C96F-433F-AB7D-4E562F9FAF9E}" type="slidenum">
               <a:rPr lang="ru-RU" smtClean="0"/>
+              <a:pPr/>
               <a:t>1</a:t>
             </a:fld>
             <a:endParaRPr lang="ru-RU"/>
@@ -926,6 +930,7 @@
           <a:p>
             <a:fld id="{9AFCB65F-FF09-4750-A1B1-6519E2C14903}" type="datetimeFigureOut">
               <a:rPr lang="ru-RU" smtClean="0"/>
+              <a:pPr/>
               <a:t>09.06.2016</a:t>
             </a:fld>
             <a:endParaRPr lang="ru-RU"/>
@@ -968,6 +973,7 @@
           <a:p>
             <a:fld id="{5221E789-A14E-4906-91B5-3D815E641295}" type="slidenum">
               <a:rPr lang="ru-RU" smtClean="0"/>
+              <a:pPr/>
               <a:t>‹#›</a:t>
             </a:fld>
             <a:endParaRPr lang="ru-RU"/>
@@ -1091,6 +1097,7 @@
           <a:p>
             <a:fld id="{9AFCB65F-FF09-4750-A1B1-6519E2C14903}" type="datetimeFigureOut">
               <a:rPr lang="ru-RU" smtClean="0"/>
+              <a:pPr/>
               <a:t>09.06.2016</a:t>
             </a:fld>
             <a:endParaRPr lang="ru-RU"/>
@@ -1133,6 +1140,7 @@
           <a:p>
             <a:fld id="{5221E789-A14E-4906-91B5-3D815E641295}" type="slidenum">
               <a:rPr lang="ru-RU" smtClean="0"/>
+              <a:pPr/>
               <a:t>‹#›</a:t>
             </a:fld>
             <a:endParaRPr lang="ru-RU"/>
@@ -1266,6 +1274,7 @@
           <a:p>
             <a:fld id="{9AFCB65F-FF09-4750-A1B1-6519E2C14903}" type="datetimeFigureOut">
               <a:rPr lang="ru-RU" smtClean="0"/>
+              <a:pPr/>
               <a:t>09.06.2016</a:t>
             </a:fld>
             <a:endParaRPr lang="ru-RU"/>
@@ -1308,6 +1317,7 @@
           <a:p>
             <a:fld id="{5221E789-A14E-4906-91B5-3D815E641295}" type="slidenum">
               <a:rPr lang="ru-RU" smtClean="0"/>
+              <a:pPr/>
               <a:t>‹#›</a:t>
             </a:fld>
             <a:endParaRPr lang="ru-RU"/>
@@ -1435,6 +1445,7 @@
           <a:p>
             <a:fld id="{9AFCB65F-FF09-4750-A1B1-6519E2C14903}" type="datetimeFigureOut">
               <a:rPr lang="ru-RU" smtClean="0"/>
+              <a:pPr/>
               <a:t>09.06.2016</a:t>
             </a:fld>
             <a:endParaRPr lang="ru-RU"/>
@@ -1477,6 +1488,7 @@
           <a:p>
             <a:fld id="{5221E789-A14E-4906-91B5-3D815E641295}" type="slidenum">
               <a:rPr lang="ru-RU" smtClean="0"/>
+              <a:pPr/>
               <a:t>‹#›</a:t>
             </a:fld>
             <a:endParaRPr lang="ru-RU"/>
@@ -1890,6 +1902,7 @@
           <a:p>
             <a:fld id="{9AFCB65F-FF09-4750-A1B1-6519E2C14903}" type="datetimeFigureOut">
               <a:rPr lang="ru-RU" smtClean="0"/>
+              <a:pPr/>
               <a:t>09.06.2016</a:t>
             </a:fld>
             <a:endParaRPr lang="ru-RU"/>
@@ -1932,6 +1945,7 @@
           <a:p>
             <a:fld id="{5221E789-A14E-4906-91B5-3D815E641295}" type="slidenum">
               <a:rPr lang="ru-RU" smtClean="0"/>
+              <a:pPr/>
               <a:t>‹#›</a:t>
             </a:fld>
             <a:endParaRPr lang="ru-RU"/>
@@ -2154,6 +2168,7 @@
           <a:p>
             <a:fld id="{9AFCB65F-FF09-4750-A1B1-6519E2C14903}" type="datetimeFigureOut">
               <a:rPr lang="ru-RU" smtClean="0"/>
+              <a:pPr/>
               <a:t>09.06.2016</a:t>
             </a:fld>
             <a:endParaRPr lang="ru-RU"/>
@@ -2196,6 +2211,7 @@
           <a:p>
             <a:fld id="{5221E789-A14E-4906-91B5-3D815E641295}" type="slidenum">
               <a:rPr lang="ru-RU" smtClean="0"/>
+              <a:pPr/>
               <a:t>‹#›</a:t>
             </a:fld>
             <a:endParaRPr lang="ru-RU"/>
@@ -2528,6 +2544,7 @@
           <a:p>
             <a:fld id="{9AFCB65F-FF09-4750-A1B1-6519E2C14903}" type="datetimeFigureOut">
               <a:rPr lang="ru-RU" smtClean="0"/>
+              <a:pPr/>
               <a:t>09.06.2016</a:t>
             </a:fld>
             <a:endParaRPr lang="ru-RU"/>
@@ -2570,6 +2587,7 @@
           <a:p>
             <a:fld id="{5221E789-A14E-4906-91B5-3D815E641295}" type="slidenum">
               <a:rPr lang="ru-RU" smtClean="0"/>
+              <a:pPr/>
               <a:t>‹#›</a:t>
             </a:fld>
             <a:endParaRPr lang="ru-RU"/>
@@ -2650,6 +2668,7 @@
           <a:p>
             <a:fld id="{9AFCB65F-FF09-4750-A1B1-6519E2C14903}" type="datetimeFigureOut">
               <a:rPr lang="ru-RU" smtClean="0"/>
+              <a:pPr/>
               <a:t>09.06.2016</a:t>
             </a:fld>
             <a:endParaRPr lang="ru-RU"/>
@@ -2673,6 +2692,7 @@
           <a:p>
             <a:fld id="{5221E789-A14E-4906-91B5-3D815E641295}" type="slidenum">
               <a:rPr lang="ru-RU" smtClean="0"/>
+              <a:pPr/>
               <a:t>‹#›</a:t>
             </a:fld>
             <a:endParaRPr lang="ru-RU"/>
@@ -2740,6 +2760,7 @@
           <a:p>
             <a:fld id="{9AFCB65F-FF09-4750-A1B1-6519E2C14903}" type="datetimeFigureOut">
               <a:rPr lang="ru-RU" smtClean="0"/>
+              <a:pPr/>
               <a:t>09.06.2016</a:t>
             </a:fld>
             <a:endParaRPr lang="ru-RU"/>
@@ -2782,6 +2803,7 @@
           <a:p>
             <a:fld id="{5221E789-A14E-4906-91B5-3D815E641295}" type="slidenum">
               <a:rPr lang="ru-RU" smtClean="0"/>
+              <a:pPr/>
               <a:t>‹#›</a:t>
             </a:fld>
             <a:endParaRPr lang="ru-RU"/>
@@ -2989,6 +3011,7 @@
           <a:p>
             <a:fld id="{9AFCB65F-FF09-4750-A1B1-6519E2C14903}" type="datetimeFigureOut">
               <a:rPr lang="ru-RU" smtClean="0"/>
+              <a:pPr/>
               <a:t>09.06.2016</a:t>
             </a:fld>
             <a:endParaRPr lang="ru-RU"/>
@@ -3036,6 +3059,7 @@
           <a:p>
             <a:fld id="{5221E789-A14E-4906-91B5-3D815E641295}" type="slidenum">
               <a:rPr lang="ru-RU" smtClean="0"/>
+              <a:pPr/>
               <a:t>‹#›</a:t>
             </a:fld>
             <a:endParaRPr lang="ru-RU"/>
@@ -3248,6 +3272,7 @@
           <a:p>
             <a:fld id="{9AFCB65F-FF09-4750-A1B1-6519E2C14903}" type="datetimeFigureOut">
               <a:rPr lang="ru-RU" smtClean="0"/>
+              <a:pPr/>
               <a:t>09.06.2016</a:t>
             </a:fld>
             <a:endParaRPr lang="ru-RU"/>
@@ -3290,6 +3315,7 @@
           <a:p>
             <a:fld id="{5221E789-A14E-4906-91B5-3D815E641295}" type="slidenum">
               <a:rPr lang="ru-RU" smtClean="0"/>
+              <a:pPr/>
               <a:t>‹#›</a:t>
             </a:fld>
             <a:endParaRPr lang="ru-RU"/>
@@ -3652,6 +3678,7 @@
           <a:p>
             <a:fld id="{9AFCB65F-FF09-4750-A1B1-6519E2C14903}" type="datetimeFigureOut">
               <a:rPr lang="ru-RU" smtClean="0"/>
+              <a:pPr/>
               <a:t>09.06.2016</a:t>
             </a:fld>
             <a:endParaRPr lang="ru-RU"/>
@@ -3730,6 +3757,7 @@
           <a:p>
             <a:fld id="{5221E789-A14E-4906-91B5-3D815E641295}" type="slidenum">
               <a:rPr lang="ru-RU" smtClean="0"/>
+              <a:pPr/>
               <a:t>‹#›</a:t>
             </a:fld>
             <a:endParaRPr lang="ru-RU"/>
@@ -4578,6 +4606,390 @@
             <a:r>
               <a:rPr lang="ru-RU" dirty="0" smtClean="0"/>
               <a:t>Использование модулей</a:t>
+            </a:r>
+            <a:endParaRPr lang="ru-RU" dirty="0"/>
+          </a:p>
+        </p:txBody>
+      </p:sp>
+    </p:spTree>
+  </p:cSld>
+  <p:clrMapOvr>
+    <a:masterClrMapping/>
+  </p:clrMapOvr>
+</p:sld>
+</file>
+
+<file path=ppt/slides/slide6.xml><?xml version="1.0" encoding="utf-8"?>
+<p:sld xmlns:a="http://schemas.openxmlformats.org/drawingml/2006/main" xmlns:r="http://schemas.openxmlformats.org/officeDocument/2006/relationships" xmlns:p="http://schemas.openxmlformats.org/presentationml/2006/main">
+  <p:cSld>
+    <p:spTree>
+      <p:nvGrpSpPr>
+        <p:cNvPr id="1" name=""/>
+        <p:cNvGrpSpPr/>
+        <p:nvPr/>
+      </p:nvGrpSpPr>
+      <p:grpSpPr>
+        <a:xfrm>
+          <a:off x="0" y="0"/>
+          <a:ext cx="0" cy="0"/>
+          <a:chOff x="0" y="0"/>
+          <a:chExt cx="0" cy="0"/>
+        </a:xfrm>
+      </p:grpSpPr>
+      <p:sp>
+        <p:nvSpPr>
+          <p:cNvPr id="3" name="Содержимое 2"/>
+          <p:cNvSpPr>
+            <a:spLocks noGrp="1"/>
+          </p:cNvSpPr>
+          <p:nvPr>
+            <p:ph idx="1"/>
+          </p:nvPr>
+        </p:nvSpPr>
+        <p:spPr>
+          <a:xfrm>
+            <a:off x="214282" y="285728"/>
+            <a:ext cx="8686800" cy="6357982"/>
+          </a:xfrm>
+        </p:spPr>
+        <p:txBody>
+          <a:bodyPr>
+            <a:normAutofit fontScale="47500" lnSpcReduction="20000"/>
+          </a:bodyPr>
+          <a:lstStyle/>
+          <a:p>
+            <a:pPr>
+              <a:buNone/>
+            </a:pPr>
+            <a:r>
+              <a:rPr lang="en-US" dirty="0" smtClean="0"/>
+              <a:t>#include &lt;math&gt;</a:t>
+            </a:r>
+          </a:p>
+          <a:p>
+            <a:pPr>
+              <a:buNone/>
+            </a:pPr>
+            <a:r>
+              <a:rPr lang="en-US" dirty="0" smtClean="0"/>
+              <a:t>#include "something.hak"</a:t>
+            </a:r>
+          </a:p>
+          <a:p>
+            <a:endParaRPr lang="en-US" dirty="0" smtClean="0"/>
+          </a:p>
+          <a:p>
+            <a:pPr>
+              <a:buNone/>
+            </a:pPr>
+            <a:r>
+              <a:rPr lang="en-US" dirty="0" smtClean="0"/>
+              <a:t>signed float </a:t>
+            </a:r>
+            <a:r>
+              <a:rPr lang="en-US" dirty="0" err="1" smtClean="0"/>
+              <a:t>sqr</a:t>
+            </a:r>
+            <a:r>
+              <a:rPr lang="en-US" dirty="0" smtClean="0"/>
+              <a:t>(float x)</a:t>
+            </a:r>
+          </a:p>
+          <a:p>
+            <a:pPr>
+              <a:buNone/>
+            </a:pPr>
+            <a:r>
+              <a:rPr lang="en-US" dirty="0" smtClean="0"/>
+              <a:t>{</a:t>
+            </a:r>
+          </a:p>
+          <a:p>
+            <a:pPr>
+              <a:buNone/>
+            </a:pPr>
+            <a:r>
+              <a:rPr lang="en-US" dirty="0" smtClean="0"/>
+              <a:t>	signed float result = x * x;</a:t>
+            </a:r>
+          </a:p>
+          <a:p>
+            <a:pPr>
+              <a:buNone/>
+            </a:pPr>
+            <a:r>
+              <a:rPr lang="en-US" dirty="0" smtClean="0"/>
+              <a:t>	return result;</a:t>
+            </a:r>
+          </a:p>
+          <a:p>
+            <a:pPr>
+              <a:buNone/>
+            </a:pPr>
+            <a:r>
+              <a:rPr lang="en-US" dirty="0" smtClean="0"/>
+              <a:t>}</a:t>
+            </a:r>
+          </a:p>
+          <a:p>
+            <a:endParaRPr lang="en-US" dirty="0" smtClean="0"/>
+          </a:p>
+          <a:p>
+            <a:pPr>
+              <a:buNone/>
+            </a:pPr>
+            <a:r>
+              <a:rPr lang="en-US" dirty="0" err="1" smtClean="0"/>
+              <a:t>int</a:t>
+            </a:r>
+            <a:r>
+              <a:rPr lang="en-US" dirty="0" smtClean="0"/>
+              <a:t> main()</a:t>
+            </a:r>
+          </a:p>
+          <a:p>
+            <a:pPr>
+              <a:buNone/>
+            </a:pPr>
+            <a:r>
+              <a:rPr lang="en-US" dirty="0" smtClean="0"/>
+              <a:t>{</a:t>
+            </a:r>
+          </a:p>
+          <a:p>
+            <a:pPr>
+              <a:buNone/>
+            </a:pPr>
+            <a:r>
+              <a:rPr lang="en-US" dirty="0" smtClean="0"/>
+              <a:t>	const signed </a:t>
+            </a:r>
+            <a:r>
+              <a:rPr lang="en-US" dirty="0" err="1" smtClean="0"/>
+              <a:t>int</a:t>
+            </a:r>
+            <a:r>
+              <a:rPr lang="en-US" dirty="0" smtClean="0"/>
+              <a:t> number = 0;</a:t>
+            </a:r>
+          </a:p>
+          <a:p>
+            <a:pPr>
+              <a:buNone/>
+            </a:pPr>
+            <a:r>
+              <a:rPr lang="en-US" dirty="0" smtClean="0"/>
+              <a:t>	signed float _</a:t>
+            </a:r>
+            <a:r>
+              <a:rPr lang="en-US" dirty="0" err="1" smtClean="0"/>
+              <a:t>float_Number</a:t>
+            </a:r>
+            <a:r>
+              <a:rPr lang="en-US" dirty="0" smtClean="0"/>
+              <a:t> = 1.2;</a:t>
+            </a:r>
+          </a:p>
+          <a:p>
+            <a:pPr>
+              <a:buNone/>
+            </a:pPr>
+            <a:r>
+              <a:rPr lang="en-US" dirty="0" smtClean="0"/>
+              <a:t>	signed </a:t>
+            </a:r>
+            <a:r>
+              <a:rPr lang="en-US" dirty="0" err="1" smtClean="0"/>
+              <a:t>int</a:t>
+            </a:r>
+            <a:r>
+              <a:rPr lang="en-US" dirty="0" smtClean="0"/>
+              <a:t> const* </a:t>
+            </a:r>
+            <a:r>
+              <a:rPr lang="en-US" dirty="0" err="1" smtClean="0"/>
+              <a:t>pNumber</a:t>
+            </a:r>
+            <a:r>
+              <a:rPr lang="en-US" dirty="0" smtClean="0"/>
+              <a:t> = &amp;number;</a:t>
+            </a:r>
+          </a:p>
+          <a:p>
+            <a:endParaRPr lang="en-US" dirty="0" smtClean="0"/>
+          </a:p>
+          <a:p>
+            <a:pPr>
+              <a:buNone/>
+            </a:pPr>
+            <a:r>
+              <a:rPr lang="en-US" dirty="0" smtClean="0"/>
+              <a:t>	if(*number == 1)</a:t>
+            </a:r>
+          </a:p>
+          <a:p>
+            <a:pPr>
+              <a:buNone/>
+            </a:pPr>
+            <a:r>
+              <a:rPr lang="en-US" dirty="0" smtClean="0"/>
+              <a:t>	{</a:t>
+            </a:r>
+          </a:p>
+          <a:p>
+            <a:pPr>
+              <a:buNone/>
+            </a:pPr>
+            <a:r>
+              <a:rPr lang="en-US" dirty="0" smtClean="0"/>
+              <a:t>		</a:t>
+            </a:r>
+            <a:r>
+              <a:rPr lang="en-US" dirty="0" err="1" smtClean="0"/>
+              <a:t>printf</a:t>
+            </a:r>
+            <a:r>
+              <a:rPr lang="en-US" dirty="0" smtClean="0"/>
+              <a:t>("1");</a:t>
+            </a:r>
+          </a:p>
+          <a:p>
+            <a:pPr>
+              <a:buNone/>
+            </a:pPr>
+            <a:r>
+              <a:rPr lang="en-US" dirty="0" smtClean="0"/>
+              <a:t>	} else </a:t>
+            </a:r>
+          </a:p>
+          <a:p>
+            <a:pPr>
+              <a:buNone/>
+            </a:pPr>
+            <a:r>
+              <a:rPr lang="en-US" dirty="0" smtClean="0"/>
+              <a:t>	{</a:t>
+            </a:r>
+          </a:p>
+          <a:p>
+            <a:pPr>
+              <a:buNone/>
+            </a:pPr>
+            <a:r>
+              <a:rPr lang="en-US" dirty="0" smtClean="0"/>
+              <a:t>		</a:t>
+            </a:r>
+            <a:r>
+              <a:rPr lang="en-US" dirty="0" err="1" smtClean="0"/>
+              <a:t>printf</a:t>
+            </a:r>
+            <a:r>
+              <a:rPr lang="en-US" dirty="0" smtClean="0"/>
+              <a:t>(</a:t>
+            </a:r>
+            <a:r>
+              <a:rPr lang="en-US" dirty="0" err="1" smtClean="0"/>
+              <a:t>sqr</a:t>
+            </a:r>
+            <a:r>
+              <a:rPr lang="en-US" dirty="0" smtClean="0"/>
+              <a:t>(9));// 81</a:t>
+            </a:r>
+          </a:p>
+          <a:p>
+            <a:pPr>
+              <a:buNone/>
+            </a:pPr>
+            <a:r>
+              <a:rPr lang="en-US" dirty="0" smtClean="0"/>
+              <a:t>		</a:t>
+            </a:r>
+            <a:r>
+              <a:rPr lang="en-US" dirty="0" err="1" smtClean="0"/>
+              <a:t>printf</a:t>
+            </a:r>
+            <a:r>
+              <a:rPr lang="en-US" dirty="0" smtClean="0"/>
+              <a:t>("0");</a:t>
+            </a:r>
+          </a:p>
+          <a:p>
+            <a:pPr>
+              <a:buNone/>
+            </a:pPr>
+            <a:r>
+              <a:rPr lang="en-US" dirty="0" smtClean="0"/>
+              <a:t>		</a:t>
+            </a:r>
+            <a:r>
+              <a:rPr lang="en-US" dirty="0" err="1" smtClean="0"/>
+              <a:t>printf</a:t>
+            </a:r>
+            <a:r>
+              <a:rPr lang="en-US" dirty="0" smtClean="0"/>
+              <a:t>(_</a:t>
+            </a:r>
+            <a:r>
+              <a:rPr lang="en-US" dirty="0" err="1" smtClean="0"/>
+              <a:t>float_Number</a:t>
+            </a:r>
+            <a:r>
+              <a:rPr lang="en-US" dirty="0" smtClean="0"/>
+              <a:t>);</a:t>
+            </a:r>
+          </a:p>
+          <a:p>
+            <a:pPr>
+              <a:buNone/>
+            </a:pPr>
+            <a:r>
+              <a:rPr lang="en-US" dirty="0" smtClean="0"/>
+              <a:t>	}	</a:t>
+            </a:r>
+          </a:p>
+          <a:p>
+            <a:pPr>
+              <a:buNone/>
+            </a:pPr>
+            <a:r>
+              <a:rPr lang="en-US" dirty="0" smtClean="0"/>
+              <a:t>	/*</a:t>
+            </a:r>
+          </a:p>
+          <a:p>
+            <a:pPr>
+              <a:buNone/>
+            </a:pPr>
+            <a:r>
+              <a:rPr lang="en-US" dirty="0" smtClean="0"/>
+              <a:t>	TODO : </a:t>
+            </a:r>
+            <a:r>
+              <a:rPr lang="ru-RU" dirty="0" smtClean="0"/>
+              <a:t>многострочный комментарий</a:t>
+            </a:r>
+          </a:p>
+          <a:p>
+            <a:pPr>
+              <a:buNone/>
+            </a:pPr>
+            <a:r>
+              <a:rPr lang="en-US" dirty="0" smtClean="0"/>
+              <a:t>	</a:t>
+            </a:r>
+            <a:r>
+              <a:rPr lang="ru-RU" dirty="0" smtClean="0"/>
+              <a:t>*/</a:t>
+            </a:r>
+            <a:endParaRPr lang="ru-RU" dirty="0" smtClean="0"/>
+          </a:p>
+          <a:p>
+            <a:pPr>
+              <a:buNone/>
+            </a:pPr>
+            <a:r>
+              <a:rPr lang="ru-RU" dirty="0" smtClean="0"/>
+              <a:t>}</a:t>
             </a:r>
             <a:endParaRPr lang="ru-RU" dirty="0"/>
           </a:p>

</xml_diff>